<commit_message>
UPDATES RESEARCH QUESTION PPT
</commit_message>
<xml_diff>
--- a/reseach_question_presentation_template.pptx
+++ b/reseach_question_presentation_template.pptx
@@ -187,7 +187,7 @@
           <p:cNvPr id="2" name="Header Placeholder 1">
             <a:extLst>
               <a:ext uri="{FF2B5EF4-FFF2-40B4-BE49-F238E27FC236}">
-                <a16:creationId xmlns="" xmlns:a16="http://schemas.microsoft.com/office/drawing/2014/main" id="{898966F2-21A1-4B2B-ADA6-AD0BB447B7CB}"/>
+                <a16:creationId xmlns:a16="http://schemas.microsoft.com/office/drawing/2014/main" id="{898966F2-21A1-4B2B-ADA6-AD0BB447B7CB}"/>
               </a:ext>
             </a:extLst>
           </p:cNvPr>
@@ -224,7 +224,7 @@
           <p:cNvPr id="3" name="Date Placeholder 2">
             <a:extLst>
               <a:ext uri="{FF2B5EF4-FFF2-40B4-BE49-F238E27FC236}">
-                <a16:creationId xmlns="" xmlns:a16="http://schemas.microsoft.com/office/drawing/2014/main" id="{751468BB-CDF2-4507-B4EF-7B369D307A4D}"/>
+                <a16:creationId xmlns:a16="http://schemas.microsoft.com/office/drawing/2014/main" id="{751468BB-CDF2-4507-B4EF-7B369D307A4D}"/>
               </a:ext>
             </a:extLst>
           </p:cNvPr>
@@ -266,7 +266,7 @@
           <p:cNvPr id="4" name="Footer Placeholder 3">
             <a:extLst>
               <a:ext uri="{FF2B5EF4-FFF2-40B4-BE49-F238E27FC236}">
-                <a16:creationId xmlns="" xmlns:a16="http://schemas.microsoft.com/office/drawing/2014/main" id="{904BCF7D-6037-48D3-84E5-56B8B0552143}"/>
+                <a16:creationId xmlns:a16="http://schemas.microsoft.com/office/drawing/2014/main" id="{904BCF7D-6037-48D3-84E5-56B8B0552143}"/>
               </a:ext>
             </a:extLst>
           </p:cNvPr>
@@ -303,7 +303,7 @@
           <p:cNvPr id="5" name="Slide Number Placeholder 4">
             <a:extLst>
               <a:ext uri="{FF2B5EF4-FFF2-40B4-BE49-F238E27FC236}">
-                <a16:creationId xmlns="" xmlns:a16="http://schemas.microsoft.com/office/drawing/2014/main" id="{D619E732-656C-4BB5-ACCB-1568C5C66DD7}"/>
+                <a16:creationId xmlns:a16="http://schemas.microsoft.com/office/drawing/2014/main" id="{D619E732-656C-4BB5-ACCB-1568C5C66DD7}"/>
               </a:ext>
             </a:extLst>
           </p:cNvPr>
@@ -1014,7 +1014,7 @@
           <p:cNvPr id="4" name="Picture 3" descr="University of Hertfordshire logo">
             <a:extLst>
               <a:ext uri="{FF2B5EF4-FFF2-40B4-BE49-F238E27FC236}">
-                <a16:creationId xmlns="" xmlns:a16="http://schemas.microsoft.com/office/drawing/2014/main" id="{16E4BB13-0D32-AA4A-BF91-2B76A7C18242}"/>
+                <a16:creationId xmlns:a16="http://schemas.microsoft.com/office/drawing/2014/main" id="{16E4BB13-0D32-AA4A-BF91-2B76A7C18242}"/>
               </a:ext>
             </a:extLst>
           </p:cNvPr>
@@ -1088,7 +1088,7 @@
           <p:cNvPr id="3" name="Picture Placeholder 2">
             <a:extLst>
               <a:ext uri="{FF2B5EF4-FFF2-40B4-BE49-F238E27FC236}">
-                <a16:creationId xmlns="" xmlns:a16="http://schemas.microsoft.com/office/drawing/2014/main" id="{A307C322-846C-9045-AD91-A93C82FC5AAF}"/>
+                <a16:creationId xmlns:a16="http://schemas.microsoft.com/office/drawing/2014/main" id="{A307C322-846C-9045-AD91-A93C82FC5AAF}"/>
               </a:ext>
             </a:extLst>
           </p:cNvPr>
@@ -1167,7 +1167,7 @@
           <p:cNvPr id="9" name="Media Placeholder 8">
             <a:extLst>
               <a:ext uri="{FF2B5EF4-FFF2-40B4-BE49-F238E27FC236}">
-                <a16:creationId xmlns="" xmlns:a16="http://schemas.microsoft.com/office/drawing/2014/main" id="{9ABCF9A5-761F-434B-BBB5-D788CB1E79D8}"/>
+                <a16:creationId xmlns:a16="http://schemas.microsoft.com/office/drawing/2014/main" id="{9ABCF9A5-761F-434B-BBB5-D788CB1E79D8}"/>
               </a:ext>
             </a:extLst>
           </p:cNvPr>
@@ -1238,7 +1238,7 @@
           <p:cNvPr id="5" name="Footer Placeholder 4">
             <a:extLst>
               <a:ext uri="{FF2B5EF4-FFF2-40B4-BE49-F238E27FC236}">
-                <a16:creationId xmlns="" xmlns:a16="http://schemas.microsoft.com/office/drawing/2014/main" id="{962B6D5D-0892-4B4E-86D9-894852B1242C}"/>
+                <a16:creationId xmlns:a16="http://schemas.microsoft.com/office/drawing/2014/main" id="{962B6D5D-0892-4B4E-86D9-894852B1242C}"/>
               </a:ext>
             </a:extLst>
           </p:cNvPr>
@@ -1267,7 +1267,7 @@
           <p:cNvPr id="6" name="Slide Number Placeholder 5">
             <a:extLst>
               <a:ext uri="{FF2B5EF4-FFF2-40B4-BE49-F238E27FC236}">
-                <a16:creationId xmlns="" xmlns:a16="http://schemas.microsoft.com/office/drawing/2014/main" id="{3B7428FC-C061-4730-9EA5-A52A00413991}"/>
+                <a16:creationId xmlns:a16="http://schemas.microsoft.com/office/drawing/2014/main" id="{3B7428FC-C061-4730-9EA5-A52A00413991}"/>
               </a:ext>
             </a:extLst>
           </p:cNvPr>
@@ -1297,7 +1297,7 @@
           <p:cNvPr id="7" name="Rectangle 6">
             <a:extLst>
               <a:ext uri="{FF2B5EF4-FFF2-40B4-BE49-F238E27FC236}">
-                <a16:creationId xmlns="" xmlns:a16="http://schemas.microsoft.com/office/drawing/2014/main" id="{850AA271-B0BA-42CD-A544-17AAB1FA2EEA}"/>
+                <a16:creationId xmlns:a16="http://schemas.microsoft.com/office/drawing/2014/main" id="{850AA271-B0BA-42CD-A544-17AAB1FA2EEA}"/>
               </a:ext>
             </a:extLst>
           </p:cNvPr>
@@ -1349,7 +1349,7 @@
           <p:cNvPr id="16" name="Content Placeholder 2">
             <a:extLst>
               <a:ext uri="{FF2B5EF4-FFF2-40B4-BE49-F238E27FC236}">
-                <a16:creationId xmlns="" xmlns:a16="http://schemas.microsoft.com/office/drawing/2014/main" id="{699880E3-4DE3-A642-9738-DF49DDCC9AC5}"/>
+                <a16:creationId xmlns:a16="http://schemas.microsoft.com/office/drawing/2014/main" id="{699880E3-4DE3-A642-9738-DF49DDCC9AC5}"/>
               </a:ext>
             </a:extLst>
           </p:cNvPr>
@@ -1406,7 +1406,7 @@
           <p:cNvPr id="17" name="Content Placeholder 2">
             <a:extLst>
               <a:ext uri="{FF2B5EF4-FFF2-40B4-BE49-F238E27FC236}">
-                <a16:creationId xmlns="" xmlns:a16="http://schemas.microsoft.com/office/drawing/2014/main" id="{CF37D495-D835-8E4B-A177-5E12F893DDCA}"/>
+                <a16:creationId xmlns:a16="http://schemas.microsoft.com/office/drawing/2014/main" id="{CF37D495-D835-8E4B-A177-5E12F893DDCA}"/>
               </a:ext>
             </a:extLst>
           </p:cNvPr>
@@ -1498,7 +1498,7 @@
           <p:cNvPr id="18" name="Content Placeholder 2">
             <a:extLst>
               <a:ext uri="{FF2B5EF4-FFF2-40B4-BE49-F238E27FC236}">
-                <a16:creationId xmlns="" xmlns:a16="http://schemas.microsoft.com/office/drawing/2014/main" id="{A6804C7E-983C-9246-90C0-AF8A0CE2CA84}"/>
+                <a16:creationId xmlns:a16="http://schemas.microsoft.com/office/drawing/2014/main" id="{A6804C7E-983C-9246-90C0-AF8A0CE2CA84}"/>
               </a:ext>
             </a:extLst>
           </p:cNvPr>
@@ -1589,7 +1589,7 @@
           <p:cNvPr id="8" name="Picture Placeholder 7">
             <a:extLst>
               <a:ext uri="{FF2B5EF4-FFF2-40B4-BE49-F238E27FC236}">
-                <a16:creationId xmlns="" xmlns:a16="http://schemas.microsoft.com/office/drawing/2014/main" id="{84410427-8F1D-7541-9C05-AFDD3531678D}"/>
+                <a16:creationId xmlns:a16="http://schemas.microsoft.com/office/drawing/2014/main" id="{84410427-8F1D-7541-9C05-AFDD3531678D}"/>
               </a:ext>
             </a:extLst>
           </p:cNvPr>
@@ -1619,7 +1619,7 @@
           <p:cNvPr id="20" name="Picture Placeholder 7">
             <a:extLst>
               <a:ext uri="{FF2B5EF4-FFF2-40B4-BE49-F238E27FC236}">
-                <a16:creationId xmlns="" xmlns:a16="http://schemas.microsoft.com/office/drawing/2014/main" id="{8B7D5964-7A97-5742-8717-CCB747F84A08}"/>
+                <a16:creationId xmlns:a16="http://schemas.microsoft.com/office/drawing/2014/main" id="{8B7D5964-7A97-5742-8717-CCB747F84A08}"/>
               </a:ext>
             </a:extLst>
           </p:cNvPr>
@@ -1649,7 +1649,7 @@
           <p:cNvPr id="21" name="Picture Placeholder 7">
             <a:extLst>
               <a:ext uri="{FF2B5EF4-FFF2-40B4-BE49-F238E27FC236}">
-                <a16:creationId xmlns="" xmlns:a16="http://schemas.microsoft.com/office/drawing/2014/main" id="{344933FE-A401-A841-9AC3-B75285AA32D2}"/>
+                <a16:creationId xmlns:a16="http://schemas.microsoft.com/office/drawing/2014/main" id="{344933FE-A401-A841-9AC3-B75285AA32D2}"/>
               </a:ext>
             </a:extLst>
           </p:cNvPr>
@@ -1717,7 +1717,7 @@
           <p:cNvPr id="7" name="Picture 6">
             <a:extLst>
               <a:ext uri="{FF2B5EF4-FFF2-40B4-BE49-F238E27FC236}">
-                <a16:creationId xmlns="" xmlns:a16="http://schemas.microsoft.com/office/drawing/2014/main" id="{EE2CE188-32E7-4242-9E44-E8055FC030CC}"/>
+                <a16:creationId xmlns:a16="http://schemas.microsoft.com/office/drawing/2014/main" id="{EE2CE188-32E7-4242-9E44-E8055FC030CC}"/>
               </a:ext>
             </a:extLst>
           </p:cNvPr>
@@ -1752,7 +1752,7 @@
           <p:cNvPr id="2" name="Title 1">
             <a:extLst>
               <a:ext uri="{FF2B5EF4-FFF2-40B4-BE49-F238E27FC236}">
-                <a16:creationId xmlns="" xmlns:a16="http://schemas.microsoft.com/office/drawing/2014/main" id="{7381B53D-9933-445F-9B68-E730EB38A5A9}"/>
+                <a16:creationId xmlns:a16="http://schemas.microsoft.com/office/drawing/2014/main" id="{7381B53D-9933-445F-9B68-E730EB38A5A9}"/>
               </a:ext>
             </a:extLst>
           </p:cNvPr>
@@ -1804,7 +1804,7 @@
           <p:cNvPr id="5" name="Footer Placeholder 4">
             <a:extLst>
               <a:ext uri="{FF2B5EF4-FFF2-40B4-BE49-F238E27FC236}">
-                <a16:creationId xmlns="" xmlns:a16="http://schemas.microsoft.com/office/drawing/2014/main" id="{CA2BE80A-BFEC-E24A-B510-73A571F1F04F}"/>
+                <a16:creationId xmlns:a16="http://schemas.microsoft.com/office/drawing/2014/main" id="{CA2BE80A-BFEC-E24A-B510-73A571F1F04F}"/>
               </a:ext>
             </a:extLst>
           </p:cNvPr>
@@ -1852,7 +1852,7 @@
           <p:cNvPr id="6" name="Slide Number Placeholder 5">
             <a:extLst>
               <a:ext uri="{FF2B5EF4-FFF2-40B4-BE49-F238E27FC236}">
-                <a16:creationId xmlns="" xmlns:a16="http://schemas.microsoft.com/office/drawing/2014/main" id="{8E5B25B4-144A-5B4A-8EAD-2022412DF2F1}"/>
+                <a16:creationId xmlns:a16="http://schemas.microsoft.com/office/drawing/2014/main" id="{8E5B25B4-144A-5B4A-8EAD-2022412DF2F1}"/>
               </a:ext>
             </a:extLst>
           </p:cNvPr>
@@ -1935,7 +1935,7 @@
           <p:cNvPr id="2" name="Title 1">
             <a:extLst>
               <a:ext uri="{FF2B5EF4-FFF2-40B4-BE49-F238E27FC236}">
-                <a16:creationId xmlns="" xmlns:a16="http://schemas.microsoft.com/office/drawing/2014/main" id="{7381B53D-9933-445F-9B68-E730EB38A5A9}"/>
+                <a16:creationId xmlns:a16="http://schemas.microsoft.com/office/drawing/2014/main" id="{7381B53D-9933-445F-9B68-E730EB38A5A9}"/>
               </a:ext>
             </a:extLst>
           </p:cNvPr>
@@ -1982,7 +1982,7 @@
           <p:cNvPr id="3" name="Subtitle 2">
             <a:extLst>
               <a:ext uri="{FF2B5EF4-FFF2-40B4-BE49-F238E27FC236}">
-                <a16:creationId xmlns="" xmlns:a16="http://schemas.microsoft.com/office/drawing/2014/main" id="{E2C6B9F5-608F-4534-96F0-C3A5E1A638A6}"/>
+                <a16:creationId xmlns:a16="http://schemas.microsoft.com/office/drawing/2014/main" id="{E2C6B9F5-608F-4534-96F0-C3A5E1A638A6}"/>
               </a:ext>
             </a:extLst>
           </p:cNvPr>
@@ -2059,7 +2059,7 @@
           <p:cNvPr id="5" name="Footer Placeholder 4">
             <a:extLst>
               <a:ext uri="{FF2B5EF4-FFF2-40B4-BE49-F238E27FC236}">
-                <a16:creationId xmlns="" xmlns:a16="http://schemas.microsoft.com/office/drawing/2014/main" id="{0540E7B9-9AC6-4E42-A931-6FF91E6494A1}"/>
+                <a16:creationId xmlns:a16="http://schemas.microsoft.com/office/drawing/2014/main" id="{0540E7B9-9AC6-4E42-A931-6FF91E6494A1}"/>
               </a:ext>
             </a:extLst>
           </p:cNvPr>
@@ -2107,7 +2107,7 @@
           <p:cNvPr id="6" name="Slide Number Placeholder 5">
             <a:extLst>
               <a:ext uri="{FF2B5EF4-FFF2-40B4-BE49-F238E27FC236}">
-                <a16:creationId xmlns="" xmlns:a16="http://schemas.microsoft.com/office/drawing/2014/main" id="{FB16D645-6420-4785-8316-43EF780FA589}"/>
+                <a16:creationId xmlns:a16="http://schemas.microsoft.com/office/drawing/2014/main" id="{FB16D645-6420-4785-8316-43EF780FA589}"/>
               </a:ext>
             </a:extLst>
           </p:cNvPr>
@@ -2152,7 +2152,7 @@
           <p:cNvPr id="8" name="Picture 7" descr="A picture containing drawing&#10;&#10;Description automatically generated">
             <a:extLst>
               <a:ext uri="{FF2B5EF4-FFF2-40B4-BE49-F238E27FC236}">
-                <a16:creationId xmlns="" xmlns:a16="http://schemas.microsoft.com/office/drawing/2014/main" id="{BCCF2CA0-CCE3-4304-8F31-4D1CC50BCBDE}"/>
+                <a16:creationId xmlns:a16="http://schemas.microsoft.com/office/drawing/2014/main" id="{BCCF2CA0-CCE3-4304-8F31-4D1CC50BCBDE}"/>
               </a:ext>
             </a:extLst>
           </p:cNvPr>
@@ -2226,7 +2226,7 @@
           <p:cNvPr id="3" name="Subtitle 2">
             <a:extLst>
               <a:ext uri="{FF2B5EF4-FFF2-40B4-BE49-F238E27FC236}">
-                <a16:creationId xmlns="" xmlns:a16="http://schemas.microsoft.com/office/drawing/2014/main" id="{E2C6B9F5-608F-4534-96F0-C3A5E1A638A6}"/>
+                <a16:creationId xmlns:a16="http://schemas.microsoft.com/office/drawing/2014/main" id="{E2C6B9F5-608F-4534-96F0-C3A5E1A638A6}"/>
               </a:ext>
             </a:extLst>
           </p:cNvPr>
@@ -2303,7 +2303,7 @@
           <p:cNvPr id="5" name="Footer Placeholder 4">
             <a:extLst>
               <a:ext uri="{FF2B5EF4-FFF2-40B4-BE49-F238E27FC236}">
-                <a16:creationId xmlns="" xmlns:a16="http://schemas.microsoft.com/office/drawing/2014/main" id="{0540E7B9-9AC6-4E42-A931-6FF91E6494A1}"/>
+                <a16:creationId xmlns:a16="http://schemas.microsoft.com/office/drawing/2014/main" id="{0540E7B9-9AC6-4E42-A931-6FF91E6494A1}"/>
               </a:ext>
             </a:extLst>
           </p:cNvPr>
@@ -2347,7 +2347,7 @@
           <p:cNvPr id="6" name="Slide Number Placeholder 5">
             <a:extLst>
               <a:ext uri="{FF2B5EF4-FFF2-40B4-BE49-F238E27FC236}">
-                <a16:creationId xmlns="" xmlns:a16="http://schemas.microsoft.com/office/drawing/2014/main" id="{FB16D645-6420-4785-8316-43EF780FA589}"/>
+                <a16:creationId xmlns:a16="http://schemas.microsoft.com/office/drawing/2014/main" id="{FB16D645-6420-4785-8316-43EF780FA589}"/>
               </a:ext>
             </a:extLst>
           </p:cNvPr>
@@ -2392,7 +2392,7 @@
           <p:cNvPr id="9" name="Title 1">
             <a:extLst>
               <a:ext uri="{FF2B5EF4-FFF2-40B4-BE49-F238E27FC236}">
-                <a16:creationId xmlns="" xmlns:a16="http://schemas.microsoft.com/office/drawing/2014/main" id="{E9449821-0D0D-644D-97A3-D56097A9C6DA}"/>
+                <a16:creationId xmlns:a16="http://schemas.microsoft.com/office/drawing/2014/main" id="{E9449821-0D0D-644D-97A3-D56097A9C6DA}"/>
               </a:ext>
             </a:extLst>
           </p:cNvPr>
@@ -2439,7 +2439,7 @@
           <p:cNvPr id="10" name="Rectangle 9">
             <a:extLst>
               <a:ext uri="{FF2B5EF4-FFF2-40B4-BE49-F238E27FC236}">
-                <a16:creationId xmlns="" xmlns:a16="http://schemas.microsoft.com/office/drawing/2014/main" id="{44F6EB17-8019-7B4E-B53C-76B057A7C31F}"/>
+                <a16:creationId xmlns:a16="http://schemas.microsoft.com/office/drawing/2014/main" id="{44F6EB17-8019-7B4E-B53C-76B057A7C31F}"/>
               </a:ext>
             </a:extLst>
           </p:cNvPr>
@@ -2495,7 +2495,7 @@
           <p:cNvPr id="11" name="Picture 10">
             <a:extLst>
               <a:ext uri="{FF2B5EF4-FFF2-40B4-BE49-F238E27FC236}">
-                <a16:creationId xmlns="" xmlns:a16="http://schemas.microsoft.com/office/drawing/2014/main" id="{0503EF50-F00F-9643-BE53-F0A5272FC4B2}"/>
+                <a16:creationId xmlns:a16="http://schemas.microsoft.com/office/drawing/2014/main" id="{0503EF50-F00F-9643-BE53-F0A5272FC4B2}"/>
               </a:ext>
             </a:extLst>
           </p:cNvPr>
@@ -2563,7 +2563,7 @@
           <p:cNvPr id="2" name="Title 1">
             <a:extLst>
               <a:ext uri="{FF2B5EF4-FFF2-40B4-BE49-F238E27FC236}">
-                <a16:creationId xmlns="" xmlns:a16="http://schemas.microsoft.com/office/drawing/2014/main" id="{A1AAFE49-0143-472F-897B-A7DAB87AB4E4}"/>
+                <a16:creationId xmlns:a16="http://schemas.microsoft.com/office/drawing/2014/main" id="{A1AAFE49-0143-472F-897B-A7DAB87AB4E4}"/>
               </a:ext>
             </a:extLst>
           </p:cNvPr>
@@ -2592,7 +2592,7 @@
           <p:cNvPr id="3" name="Content Placeholder 2">
             <a:extLst>
               <a:ext uri="{FF2B5EF4-FFF2-40B4-BE49-F238E27FC236}">
-                <a16:creationId xmlns="" xmlns:a16="http://schemas.microsoft.com/office/drawing/2014/main" id="{981FBDFA-876B-4255-A301-F62F1EDD8D66}"/>
+                <a16:creationId xmlns:a16="http://schemas.microsoft.com/office/drawing/2014/main" id="{981FBDFA-876B-4255-A301-F62F1EDD8D66}"/>
               </a:ext>
             </a:extLst>
           </p:cNvPr>
@@ -2652,7 +2652,7 @@
           <p:cNvPr id="4" name="Content Placeholder 3">
             <a:extLst>
               <a:ext uri="{FF2B5EF4-FFF2-40B4-BE49-F238E27FC236}">
-                <a16:creationId xmlns="" xmlns:a16="http://schemas.microsoft.com/office/drawing/2014/main" id="{46F0C709-1F3D-4B13-A290-4041A33FB10E}"/>
+                <a16:creationId xmlns:a16="http://schemas.microsoft.com/office/drawing/2014/main" id="{46F0C709-1F3D-4B13-A290-4041A33FB10E}"/>
               </a:ext>
             </a:extLst>
           </p:cNvPr>
@@ -2743,7 +2743,7 @@
           <p:cNvPr id="6" name="Footer Placeholder 5">
             <a:extLst>
               <a:ext uri="{FF2B5EF4-FFF2-40B4-BE49-F238E27FC236}">
-                <a16:creationId xmlns="" xmlns:a16="http://schemas.microsoft.com/office/drawing/2014/main" id="{60A8C9C5-E913-47B9-82DE-196768E6D657}"/>
+                <a16:creationId xmlns:a16="http://schemas.microsoft.com/office/drawing/2014/main" id="{60A8C9C5-E913-47B9-82DE-196768E6D657}"/>
               </a:ext>
             </a:extLst>
           </p:cNvPr>
@@ -2772,7 +2772,7 @@
           <p:cNvPr id="7" name="Slide Number Placeholder 6">
             <a:extLst>
               <a:ext uri="{FF2B5EF4-FFF2-40B4-BE49-F238E27FC236}">
-                <a16:creationId xmlns="" xmlns:a16="http://schemas.microsoft.com/office/drawing/2014/main" id="{E1558F66-ECA3-4B00-A383-8D2B86217C93}"/>
+                <a16:creationId xmlns:a16="http://schemas.microsoft.com/office/drawing/2014/main" id="{E1558F66-ECA3-4B00-A383-8D2B86217C93}"/>
               </a:ext>
             </a:extLst>
           </p:cNvPr>
@@ -2802,7 +2802,7 @@
           <p:cNvPr id="8" name="Rectangle 7">
             <a:extLst>
               <a:ext uri="{FF2B5EF4-FFF2-40B4-BE49-F238E27FC236}">
-                <a16:creationId xmlns="" xmlns:a16="http://schemas.microsoft.com/office/drawing/2014/main" id="{62A19DAE-53D8-4F04-A4B9-B6EDFC23886D}"/>
+                <a16:creationId xmlns:a16="http://schemas.microsoft.com/office/drawing/2014/main" id="{62A19DAE-53D8-4F04-A4B9-B6EDFC23886D}"/>
               </a:ext>
             </a:extLst>
           </p:cNvPr>
@@ -2917,7 +2917,7 @@
           <p:cNvPr id="2" name="Title 1">
             <a:extLst>
               <a:ext uri="{FF2B5EF4-FFF2-40B4-BE49-F238E27FC236}">
-                <a16:creationId xmlns="" xmlns:a16="http://schemas.microsoft.com/office/drawing/2014/main" id="{A4DE70B5-BA04-4DB3-853D-A1C05ADF828C}"/>
+                <a16:creationId xmlns:a16="http://schemas.microsoft.com/office/drawing/2014/main" id="{A4DE70B5-BA04-4DB3-853D-A1C05ADF828C}"/>
               </a:ext>
             </a:extLst>
           </p:cNvPr>
@@ -2946,7 +2946,7 @@
           <p:cNvPr id="3" name="Content Placeholder 2">
             <a:extLst>
               <a:ext uri="{FF2B5EF4-FFF2-40B4-BE49-F238E27FC236}">
-                <a16:creationId xmlns="" xmlns:a16="http://schemas.microsoft.com/office/drawing/2014/main" id="{70440712-862D-4568-80A4-86117B896766}"/>
+                <a16:creationId xmlns:a16="http://schemas.microsoft.com/office/drawing/2014/main" id="{70440712-862D-4568-80A4-86117B896766}"/>
               </a:ext>
             </a:extLst>
           </p:cNvPr>
@@ -3003,7 +3003,7 @@
           <p:cNvPr id="5" name="Footer Placeholder 4">
             <a:extLst>
               <a:ext uri="{FF2B5EF4-FFF2-40B4-BE49-F238E27FC236}">
-                <a16:creationId xmlns="" xmlns:a16="http://schemas.microsoft.com/office/drawing/2014/main" id="{962B6D5D-0892-4B4E-86D9-894852B1242C}"/>
+                <a16:creationId xmlns:a16="http://schemas.microsoft.com/office/drawing/2014/main" id="{962B6D5D-0892-4B4E-86D9-894852B1242C}"/>
               </a:ext>
             </a:extLst>
           </p:cNvPr>
@@ -3032,7 +3032,7 @@
           <p:cNvPr id="6" name="Slide Number Placeholder 5">
             <a:extLst>
               <a:ext uri="{FF2B5EF4-FFF2-40B4-BE49-F238E27FC236}">
-                <a16:creationId xmlns="" xmlns:a16="http://schemas.microsoft.com/office/drawing/2014/main" id="{3B7428FC-C061-4730-9EA5-A52A00413991}"/>
+                <a16:creationId xmlns:a16="http://schemas.microsoft.com/office/drawing/2014/main" id="{3B7428FC-C061-4730-9EA5-A52A00413991}"/>
               </a:ext>
             </a:extLst>
           </p:cNvPr>
@@ -3062,7 +3062,7 @@
           <p:cNvPr id="7" name="Rectangle 6">
             <a:extLst>
               <a:ext uri="{FF2B5EF4-FFF2-40B4-BE49-F238E27FC236}">
-                <a16:creationId xmlns="" xmlns:a16="http://schemas.microsoft.com/office/drawing/2014/main" id="{850AA271-B0BA-42CD-A544-17AAB1FA2EEA}"/>
+                <a16:creationId xmlns:a16="http://schemas.microsoft.com/office/drawing/2014/main" id="{850AA271-B0BA-42CD-A544-17AAB1FA2EEA}"/>
               </a:ext>
             </a:extLst>
           </p:cNvPr>
@@ -3152,7 +3152,7 @@
           <p:cNvPr id="2" name="Title 1">
             <a:extLst>
               <a:ext uri="{FF2B5EF4-FFF2-40B4-BE49-F238E27FC236}">
-                <a16:creationId xmlns="" xmlns:a16="http://schemas.microsoft.com/office/drawing/2014/main" id="{A4DE70B5-BA04-4DB3-853D-A1C05ADF828C}"/>
+                <a16:creationId xmlns:a16="http://schemas.microsoft.com/office/drawing/2014/main" id="{A4DE70B5-BA04-4DB3-853D-A1C05ADF828C}"/>
               </a:ext>
             </a:extLst>
           </p:cNvPr>
@@ -3186,7 +3186,7 @@
           <p:cNvPr id="3" name="Content Placeholder 2">
             <a:extLst>
               <a:ext uri="{FF2B5EF4-FFF2-40B4-BE49-F238E27FC236}">
-                <a16:creationId xmlns="" xmlns:a16="http://schemas.microsoft.com/office/drawing/2014/main" id="{70440712-862D-4568-80A4-86117B896766}"/>
+                <a16:creationId xmlns:a16="http://schemas.microsoft.com/office/drawing/2014/main" id="{70440712-862D-4568-80A4-86117B896766}"/>
               </a:ext>
             </a:extLst>
           </p:cNvPr>
@@ -3243,7 +3243,7 @@
           <p:cNvPr id="6" name="Slide Number Placeholder 5">
             <a:extLst>
               <a:ext uri="{FF2B5EF4-FFF2-40B4-BE49-F238E27FC236}">
-                <a16:creationId xmlns="" xmlns:a16="http://schemas.microsoft.com/office/drawing/2014/main" id="{3B7428FC-C061-4730-9EA5-A52A00413991}"/>
+                <a16:creationId xmlns:a16="http://schemas.microsoft.com/office/drawing/2014/main" id="{3B7428FC-C061-4730-9EA5-A52A00413991}"/>
               </a:ext>
             </a:extLst>
           </p:cNvPr>
@@ -3273,7 +3273,7 @@
           <p:cNvPr id="7" name="Rectangle 6">
             <a:extLst>
               <a:ext uri="{FF2B5EF4-FFF2-40B4-BE49-F238E27FC236}">
-                <a16:creationId xmlns="" xmlns:a16="http://schemas.microsoft.com/office/drawing/2014/main" id="{850AA271-B0BA-42CD-A544-17AAB1FA2EEA}"/>
+                <a16:creationId xmlns:a16="http://schemas.microsoft.com/office/drawing/2014/main" id="{850AA271-B0BA-42CD-A544-17AAB1FA2EEA}"/>
               </a:ext>
             </a:extLst>
           </p:cNvPr>
@@ -3363,7 +3363,7 @@
           <p:cNvPr id="6" name="Slide Number Placeholder 5">
             <a:extLst>
               <a:ext uri="{FF2B5EF4-FFF2-40B4-BE49-F238E27FC236}">
-                <a16:creationId xmlns="" xmlns:a16="http://schemas.microsoft.com/office/drawing/2014/main" id="{3B7428FC-C061-4730-9EA5-A52A00413991}"/>
+                <a16:creationId xmlns:a16="http://schemas.microsoft.com/office/drawing/2014/main" id="{3B7428FC-C061-4730-9EA5-A52A00413991}"/>
               </a:ext>
             </a:extLst>
           </p:cNvPr>
@@ -3401,7 +3401,7 @@
           <p:cNvPr id="8" name="Content Placeholder 2">
             <a:extLst>
               <a:ext uri="{FF2B5EF4-FFF2-40B4-BE49-F238E27FC236}">
-                <a16:creationId xmlns="" xmlns:a16="http://schemas.microsoft.com/office/drawing/2014/main" id="{B09D4C03-E8B1-644E-949B-F7AF91181833}"/>
+                <a16:creationId xmlns:a16="http://schemas.microsoft.com/office/drawing/2014/main" id="{B09D4C03-E8B1-644E-949B-F7AF91181833}"/>
               </a:ext>
             </a:extLst>
           </p:cNvPr>
@@ -3474,7 +3474,7 @@
           <p:cNvPr id="5" name="Title 1">
             <a:extLst>
               <a:ext uri="{FF2B5EF4-FFF2-40B4-BE49-F238E27FC236}">
-                <a16:creationId xmlns="" xmlns:a16="http://schemas.microsoft.com/office/drawing/2014/main" id="{02EDA17D-AAE6-954F-93C6-90B8D7B80BD1}"/>
+                <a16:creationId xmlns:a16="http://schemas.microsoft.com/office/drawing/2014/main" id="{02EDA17D-AAE6-954F-93C6-90B8D7B80BD1}"/>
               </a:ext>
             </a:extLst>
           </p:cNvPr>
@@ -3554,7 +3554,7 @@
           <p:cNvPr id="2" name="Title 1">
             <a:extLst>
               <a:ext uri="{FF2B5EF4-FFF2-40B4-BE49-F238E27FC236}">
-                <a16:creationId xmlns="" xmlns:a16="http://schemas.microsoft.com/office/drawing/2014/main" id="{A1AAFE49-0143-472F-897B-A7DAB87AB4E4}"/>
+                <a16:creationId xmlns:a16="http://schemas.microsoft.com/office/drawing/2014/main" id="{A1AAFE49-0143-472F-897B-A7DAB87AB4E4}"/>
               </a:ext>
             </a:extLst>
           </p:cNvPr>
@@ -3583,7 +3583,7 @@
           <p:cNvPr id="4" name="Content Placeholder 3">
             <a:extLst>
               <a:ext uri="{FF2B5EF4-FFF2-40B4-BE49-F238E27FC236}">
-                <a16:creationId xmlns="" xmlns:a16="http://schemas.microsoft.com/office/drawing/2014/main" id="{46F0C709-1F3D-4B13-A290-4041A33FB10E}"/>
+                <a16:creationId xmlns:a16="http://schemas.microsoft.com/office/drawing/2014/main" id="{46F0C709-1F3D-4B13-A290-4041A33FB10E}"/>
               </a:ext>
             </a:extLst>
           </p:cNvPr>
@@ -3644,7 +3644,7 @@
           <p:cNvPr id="6" name="Footer Placeholder 5">
             <a:extLst>
               <a:ext uri="{FF2B5EF4-FFF2-40B4-BE49-F238E27FC236}">
-                <a16:creationId xmlns="" xmlns:a16="http://schemas.microsoft.com/office/drawing/2014/main" id="{60A8C9C5-E913-47B9-82DE-196768E6D657}"/>
+                <a16:creationId xmlns:a16="http://schemas.microsoft.com/office/drawing/2014/main" id="{60A8C9C5-E913-47B9-82DE-196768E6D657}"/>
               </a:ext>
             </a:extLst>
           </p:cNvPr>
@@ -3673,7 +3673,7 @@
           <p:cNvPr id="7" name="Slide Number Placeholder 6">
             <a:extLst>
               <a:ext uri="{FF2B5EF4-FFF2-40B4-BE49-F238E27FC236}">
-                <a16:creationId xmlns="" xmlns:a16="http://schemas.microsoft.com/office/drawing/2014/main" id="{E1558F66-ECA3-4B00-A383-8D2B86217C93}"/>
+                <a16:creationId xmlns:a16="http://schemas.microsoft.com/office/drawing/2014/main" id="{E1558F66-ECA3-4B00-A383-8D2B86217C93}"/>
               </a:ext>
             </a:extLst>
           </p:cNvPr>
@@ -3703,7 +3703,7 @@
           <p:cNvPr id="10" name="Picture Placeholder 9">
             <a:extLst>
               <a:ext uri="{FF2B5EF4-FFF2-40B4-BE49-F238E27FC236}">
-                <a16:creationId xmlns="" xmlns:a16="http://schemas.microsoft.com/office/drawing/2014/main" id="{874043F1-6F14-49BD-83CA-12B559ABC101}"/>
+                <a16:creationId xmlns:a16="http://schemas.microsoft.com/office/drawing/2014/main" id="{874043F1-6F14-49BD-83CA-12B559ABC101}"/>
               </a:ext>
             </a:extLst>
           </p:cNvPr>
@@ -3733,7 +3733,7 @@
           <p:cNvPr id="11" name="Rectangle 10">
             <a:extLst>
               <a:ext uri="{FF2B5EF4-FFF2-40B4-BE49-F238E27FC236}">
-                <a16:creationId xmlns="" xmlns:a16="http://schemas.microsoft.com/office/drawing/2014/main" id="{4B51C537-0174-43E5-8B81-C80AF1D06831}"/>
+                <a16:creationId xmlns:a16="http://schemas.microsoft.com/office/drawing/2014/main" id="{4B51C537-0174-43E5-8B81-C80AF1D06831}"/>
               </a:ext>
             </a:extLst>
           </p:cNvPr>
@@ -3823,7 +3823,7 @@
           <p:cNvPr id="2" name="Title 1">
             <a:extLst>
               <a:ext uri="{FF2B5EF4-FFF2-40B4-BE49-F238E27FC236}">
-                <a16:creationId xmlns="" xmlns:a16="http://schemas.microsoft.com/office/drawing/2014/main" id="{A1AAFE49-0143-472F-897B-A7DAB87AB4E4}"/>
+                <a16:creationId xmlns:a16="http://schemas.microsoft.com/office/drawing/2014/main" id="{A1AAFE49-0143-472F-897B-A7DAB87AB4E4}"/>
               </a:ext>
             </a:extLst>
           </p:cNvPr>
@@ -3852,7 +3852,7 @@
           <p:cNvPr id="6" name="Footer Placeholder 5">
             <a:extLst>
               <a:ext uri="{FF2B5EF4-FFF2-40B4-BE49-F238E27FC236}">
-                <a16:creationId xmlns="" xmlns:a16="http://schemas.microsoft.com/office/drawing/2014/main" id="{60A8C9C5-E913-47B9-82DE-196768E6D657}"/>
+                <a16:creationId xmlns:a16="http://schemas.microsoft.com/office/drawing/2014/main" id="{60A8C9C5-E913-47B9-82DE-196768E6D657}"/>
               </a:ext>
             </a:extLst>
           </p:cNvPr>
@@ -3881,7 +3881,7 @@
           <p:cNvPr id="7" name="Slide Number Placeholder 6">
             <a:extLst>
               <a:ext uri="{FF2B5EF4-FFF2-40B4-BE49-F238E27FC236}">
-                <a16:creationId xmlns="" xmlns:a16="http://schemas.microsoft.com/office/drawing/2014/main" id="{E1558F66-ECA3-4B00-A383-8D2B86217C93}"/>
+                <a16:creationId xmlns:a16="http://schemas.microsoft.com/office/drawing/2014/main" id="{E1558F66-ECA3-4B00-A383-8D2B86217C93}"/>
               </a:ext>
             </a:extLst>
           </p:cNvPr>
@@ -3911,7 +3911,7 @@
           <p:cNvPr id="8" name="Rectangle 7">
             <a:extLst>
               <a:ext uri="{FF2B5EF4-FFF2-40B4-BE49-F238E27FC236}">
-                <a16:creationId xmlns="" xmlns:a16="http://schemas.microsoft.com/office/drawing/2014/main" id="{039FCF96-B7D6-4CCD-A4AE-46A67249D3BD}"/>
+                <a16:creationId xmlns:a16="http://schemas.microsoft.com/office/drawing/2014/main" id="{039FCF96-B7D6-4CCD-A4AE-46A67249D3BD}"/>
               </a:ext>
             </a:extLst>
           </p:cNvPr>
@@ -3963,7 +3963,7 @@
           <p:cNvPr id="10" name="Content Placeholder 9">
             <a:extLst>
               <a:ext uri="{FF2B5EF4-FFF2-40B4-BE49-F238E27FC236}">
-                <a16:creationId xmlns="" xmlns:a16="http://schemas.microsoft.com/office/drawing/2014/main" id="{741F3B7A-B2BF-40FC-8EB2-F1C37D316488}"/>
+                <a16:creationId xmlns:a16="http://schemas.microsoft.com/office/drawing/2014/main" id="{741F3B7A-B2BF-40FC-8EB2-F1C37D316488}"/>
               </a:ext>
             </a:extLst>
           </p:cNvPr>
@@ -4024,7 +4024,7 @@
           <p:cNvPr id="9" name="Content Placeholder 9">
             <a:extLst>
               <a:ext uri="{FF2B5EF4-FFF2-40B4-BE49-F238E27FC236}">
-                <a16:creationId xmlns="" xmlns:a16="http://schemas.microsoft.com/office/drawing/2014/main" id="{75B7A667-B99F-7A41-AAC3-ED24B9B1D92E}"/>
+                <a16:creationId xmlns:a16="http://schemas.microsoft.com/office/drawing/2014/main" id="{75B7A667-B99F-7A41-AAC3-ED24B9B1D92E}"/>
               </a:ext>
             </a:extLst>
           </p:cNvPr>
@@ -4085,7 +4085,7 @@
           <p:cNvPr id="11" name="Content Placeholder 9">
             <a:extLst>
               <a:ext uri="{FF2B5EF4-FFF2-40B4-BE49-F238E27FC236}">
-                <a16:creationId xmlns="" xmlns:a16="http://schemas.microsoft.com/office/drawing/2014/main" id="{93C1FF47-695D-B348-AF37-1ADF5736FA9E}"/>
+                <a16:creationId xmlns:a16="http://schemas.microsoft.com/office/drawing/2014/main" id="{93C1FF47-695D-B348-AF37-1ADF5736FA9E}"/>
               </a:ext>
             </a:extLst>
           </p:cNvPr>
@@ -4181,7 +4181,7 @@
           <p:cNvPr id="2" name="Title Placeholder 1">
             <a:extLst>
               <a:ext uri="{FF2B5EF4-FFF2-40B4-BE49-F238E27FC236}">
-                <a16:creationId xmlns="" xmlns:a16="http://schemas.microsoft.com/office/drawing/2014/main" id="{DB1A62CF-E2B4-496D-829D-DCE37260977D}"/>
+                <a16:creationId xmlns:a16="http://schemas.microsoft.com/office/drawing/2014/main" id="{DB1A62CF-E2B4-496D-829D-DCE37260977D}"/>
               </a:ext>
             </a:extLst>
           </p:cNvPr>
@@ -4220,7 +4220,7 @@
           <p:cNvPr id="3" name="Text Placeholder 2">
             <a:extLst>
               <a:ext uri="{FF2B5EF4-FFF2-40B4-BE49-F238E27FC236}">
-                <a16:creationId xmlns="" xmlns:a16="http://schemas.microsoft.com/office/drawing/2014/main" id="{DFD84EF4-0E07-4BF3-A4AB-3E8632AA79AD}"/>
+                <a16:creationId xmlns:a16="http://schemas.microsoft.com/office/drawing/2014/main" id="{DFD84EF4-0E07-4BF3-A4AB-3E8632AA79AD}"/>
               </a:ext>
             </a:extLst>
           </p:cNvPr>
@@ -4288,7 +4288,7 @@
           <p:cNvPr id="5" name="Footer Placeholder 4">
             <a:extLst>
               <a:ext uri="{FF2B5EF4-FFF2-40B4-BE49-F238E27FC236}">
-                <a16:creationId xmlns="" xmlns:a16="http://schemas.microsoft.com/office/drawing/2014/main" id="{3B527A5D-B761-4C2F-97E6-5D8254424B8B}"/>
+                <a16:creationId xmlns:a16="http://schemas.microsoft.com/office/drawing/2014/main" id="{3B527A5D-B761-4C2F-97E6-5D8254424B8B}"/>
               </a:ext>
             </a:extLst>
           </p:cNvPr>
@@ -4337,7 +4337,7 @@
           <p:cNvPr id="6" name="Slide Number Placeholder 5">
             <a:extLst>
               <a:ext uri="{FF2B5EF4-FFF2-40B4-BE49-F238E27FC236}">
-                <a16:creationId xmlns="" xmlns:a16="http://schemas.microsoft.com/office/drawing/2014/main" id="{9CD661B1-4E4B-4F85-ACA3-C34023D70282}"/>
+                <a16:creationId xmlns:a16="http://schemas.microsoft.com/office/drawing/2014/main" id="{9CD661B1-4E4B-4F85-ACA3-C34023D70282}"/>
               </a:ext>
             </a:extLst>
           </p:cNvPr>
@@ -4766,7 +4766,7 @@
           <p:cNvPr id="2" name="Subtitle 1">
             <a:extLst>
               <a:ext uri="{FF2B5EF4-FFF2-40B4-BE49-F238E27FC236}">
-                <a16:creationId xmlns="" xmlns:a16="http://schemas.microsoft.com/office/drawing/2014/main" id="{6A29D8FC-E32A-5566-0930-02B99F5763A6}"/>
+                <a16:creationId xmlns:a16="http://schemas.microsoft.com/office/drawing/2014/main" id="{6A29D8FC-E32A-5566-0930-02B99F5763A6}"/>
               </a:ext>
             </a:extLst>
           </p:cNvPr>
@@ -4799,7 +4799,7 @@
           <p:cNvPr id="4" name="Slide Number Placeholder 3">
             <a:extLst>
               <a:ext uri="{FF2B5EF4-FFF2-40B4-BE49-F238E27FC236}">
-                <a16:creationId xmlns="" xmlns:a16="http://schemas.microsoft.com/office/drawing/2014/main" id="{E143B824-C7FA-8427-0A8B-E8B5D7787B83}"/>
+                <a16:creationId xmlns:a16="http://schemas.microsoft.com/office/drawing/2014/main" id="{E143B824-C7FA-8427-0A8B-E8B5D7787B83}"/>
               </a:ext>
             </a:extLst>
           </p:cNvPr>
@@ -4829,7 +4829,7 @@
           <p:cNvPr id="6" name="TextBox 5">
             <a:extLst>
               <a:ext uri="{FF2B5EF4-FFF2-40B4-BE49-F238E27FC236}">
-                <a16:creationId xmlns="" xmlns:a16="http://schemas.microsoft.com/office/drawing/2014/main" id="{6DD9461E-8553-F8C3-E23F-FB71330E931F}"/>
+                <a16:creationId xmlns:a16="http://schemas.microsoft.com/office/drawing/2014/main" id="{6DD9461E-8553-F8C3-E23F-FB71330E931F}"/>
               </a:ext>
             </a:extLst>
           </p:cNvPr>
@@ -4948,7 +4948,7 @@
           <p:cNvPr id="2" name="Title 1">
             <a:extLst>
               <a:ext uri="{FF2B5EF4-FFF2-40B4-BE49-F238E27FC236}">
-                <a16:creationId xmlns="" xmlns:a16="http://schemas.microsoft.com/office/drawing/2014/main" id="{3440AEE4-CC66-FE42-B0C3-2CC7AFD37D1C}"/>
+                <a16:creationId xmlns:a16="http://schemas.microsoft.com/office/drawing/2014/main" id="{3440AEE4-CC66-FE42-B0C3-2CC7AFD37D1C}"/>
               </a:ext>
             </a:extLst>
           </p:cNvPr>
@@ -4982,23 +4982,7 @@
             </a:br>
             <a:r>
               <a:rPr lang="en-US" sz="2200" dirty="0"/>
-              <a:t>Date:  </a:t>
-            </a:r>
-            <a:r>
-              <a:rPr lang="en-US" sz="2200" dirty="0" smtClean="0"/>
-              <a:t>19</a:t>
-            </a:r>
-            <a:r>
-              <a:rPr lang="en-US" sz="2200" dirty="0" smtClean="0"/>
-              <a:t> </a:t>
-            </a:r>
-            <a:r>
-              <a:rPr lang="en-US" sz="2200" dirty="0"/>
-              <a:t>– 11 – 24 </a:t>
-            </a:r>
-            <a:r>
-              <a:rPr lang="en-US" sz="8000" dirty="0"/>
-              <a:t/>
+              <a:t>Date:  19 – 11 – 24 </a:t>
             </a:r>
             <a:br>
               <a:rPr lang="en-US" sz="8000" dirty="0"/>
@@ -5012,7 +4996,7 @@
           <p:cNvPr id="3" name="Subtitle 2">
             <a:extLst>
               <a:ext uri="{FF2B5EF4-FFF2-40B4-BE49-F238E27FC236}">
-                <a16:creationId xmlns="" xmlns:a16="http://schemas.microsoft.com/office/drawing/2014/main" id="{8275DA97-5166-7F4B-BC83-F50AC8BEDCD7}"/>
+                <a16:creationId xmlns:a16="http://schemas.microsoft.com/office/drawing/2014/main" id="{8275DA97-5166-7F4B-BC83-F50AC8BEDCD7}"/>
               </a:ext>
             </a:extLst>
           </p:cNvPr>
@@ -5040,7 +5024,7 @@
           <p:cNvPr id="4" name="Footer Placeholder 3">
             <a:extLst>
               <a:ext uri="{FF2B5EF4-FFF2-40B4-BE49-F238E27FC236}">
-                <a16:creationId xmlns="" xmlns:a16="http://schemas.microsoft.com/office/drawing/2014/main" id="{6E7F4D14-5620-EC41-A86C-6CC3CFD691B4}"/>
+                <a16:creationId xmlns:a16="http://schemas.microsoft.com/office/drawing/2014/main" id="{6E7F4D14-5620-EC41-A86C-6CC3CFD691B4}"/>
               </a:ext>
             </a:extLst>
           </p:cNvPr>
@@ -5119,7 +5103,7 @@
           <p:cNvPr id="3" name="Footer Placeholder 2">
             <a:extLst>
               <a:ext uri="{FF2B5EF4-FFF2-40B4-BE49-F238E27FC236}">
-                <a16:creationId xmlns="" xmlns:a16="http://schemas.microsoft.com/office/drawing/2014/main" id="{E6EB5BD4-BD08-7B73-D9D9-2582DDE1B3D9}"/>
+                <a16:creationId xmlns:a16="http://schemas.microsoft.com/office/drawing/2014/main" id="{E6EB5BD4-BD08-7B73-D9D9-2582DDE1B3D9}"/>
               </a:ext>
             </a:extLst>
           </p:cNvPr>
@@ -5148,7 +5132,7 @@
           <p:cNvPr id="4" name="Slide Number Placeholder 3">
             <a:extLst>
               <a:ext uri="{FF2B5EF4-FFF2-40B4-BE49-F238E27FC236}">
-                <a16:creationId xmlns="" xmlns:a16="http://schemas.microsoft.com/office/drawing/2014/main" id="{D1098E3C-BAB5-8478-26BA-5CDF4FAEFC64}"/>
+                <a16:creationId xmlns:a16="http://schemas.microsoft.com/office/drawing/2014/main" id="{D1098E3C-BAB5-8478-26BA-5CDF4FAEFC64}"/>
               </a:ext>
             </a:extLst>
           </p:cNvPr>
@@ -5178,7 +5162,7 @@
           <p:cNvPr id="10" name="TextBox 9">
             <a:extLst>
               <a:ext uri="{FF2B5EF4-FFF2-40B4-BE49-F238E27FC236}">
-                <a16:creationId xmlns="" xmlns:a16="http://schemas.microsoft.com/office/drawing/2014/main" id="{9B2BC5F5-8FB5-A5D4-2DA3-0D0E6FC86C3A}"/>
+                <a16:creationId xmlns:a16="http://schemas.microsoft.com/office/drawing/2014/main" id="{9B2BC5F5-8FB5-A5D4-2DA3-0D0E6FC86C3A}"/>
               </a:ext>
             </a:extLst>
           </p:cNvPr>
@@ -5203,13 +5187,8 @@
           <a:p>
             <a:r>
               <a:rPr lang="en-US" sz="2800" dirty="0"/>
-              <a:t>Original dataset: approx. 54000 </a:t>
-            </a:r>
-            <a:r>
-              <a:rPr lang="en-US" sz="2800" dirty="0" smtClean="0"/>
-              <a:t>rows</a:t>
-            </a:r>
-            <a:endParaRPr lang="en-US" sz="2800" dirty="0"/>
+              <a:t>Original dataset: approx. 54000 rows</a:t>
+            </a:r>
           </a:p>
         </p:txBody>
       </p:sp>
@@ -5278,7 +5257,7 @@
           <p:cNvPr id="2" name="Subtitle 1">
             <a:extLst>
               <a:ext uri="{FF2B5EF4-FFF2-40B4-BE49-F238E27FC236}">
-                <a16:creationId xmlns="" xmlns:a16="http://schemas.microsoft.com/office/drawing/2014/main" id="{7D9D8228-727F-1E46-B5AD-91D158B8255E}"/>
+                <a16:creationId xmlns:a16="http://schemas.microsoft.com/office/drawing/2014/main" id="{7D9D8228-727F-1E46-B5AD-91D158B8255E}"/>
               </a:ext>
             </a:extLst>
           </p:cNvPr>
@@ -5337,7 +5316,7 @@
           <p:cNvPr id="3" name="Footer Placeholder 2">
             <a:extLst>
               <a:ext uri="{FF2B5EF4-FFF2-40B4-BE49-F238E27FC236}">
-                <a16:creationId xmlns="" xmlns:a16="http://schemas.microsoft.com/office/drawing/2014/main" id="{00EBC183-8AA5-EC44-9987-D65F5C1892A1}"/>
+                <a16:creationId xmlns:a16="http://schemas.microsoft.com/office/drawing/2014/main" id="{00EBC183-8AA5-EC44-9987-D65F5C1892A1}"/>
               </a:ext>
             </a:extLst>
           </p:cNvPr>
@@ -5370,7 +5349,7 @@
           <p:cNvPr id="4" name="Slide Number Placeholder 3">
             <a:extLst>
               <a:ext uri="{FF2B5EF4-FFF2-40B4-BE49-F238E27FC236}">
-                <a16:creationId xmlns="" xmlns:a16="http://schemas.microsoft.com/office/drawing/2014/main" id="{CC9D9611-42EE-7840-81EE-DD6B1A99CD7B}"/>
+                <a16:creationId xmlns:a16="http://schemas.microsoft.com/office/drawing/2014/main" id="{CC9D9611-42EE-7840-81EE-DD6B1A99CD7B}"/>
               </a:ext>
             </a:extLst>
           </p:cNvPr>
@@ -5404,7 +5383,7 @@
           <p:cNvPr id="5" name="Title 4">
             <a:extLst>
               <a:ext uri="{FF2B5EF4-FFF2-40B4-BE49-F238E27FC236}">
-                <a16:creationId xmlns="" xmlns:a16="http://schemas.microsoft.com/office/drawing/2014/main" id="{B3FA3829-F12C-214D-8FBA-7E1A740F65CA}"/>
+                <a16:creationId xmlns:a16="http://schemas.microsoft.com/office/drawing/2014/main" id="{B3FA3829-F12C-214D-8FBA-7E1A740F65CA}"/>
               </a:ext>
             </a:extLst>
           </p:cNvPr>
@@ -5439,26 +5418,12 @@
               </a:rPr>
               <a:t>This data shows if higher vaccine distribution leads to better vaccination coverage across states.</a:t>
             </a:r>
-            <a:r>
-              <a:rPr lang="en-US" sz="2800" b="0" dirty="0">
-                <a:latin typeface="Calibri" panose="020F0502020204030204" pitchFamily="34" charset="0"/>
-                <a:cs typeface="Calibri" panose="020F0502020204030204" pitchFamily="34" charset="0"/>
-              </a:rPr>
-              <a:t/>
-            </a:r>
             <a:br>
               <a:rPr lang="en-US" sz="2800" b="0" dirty="0">
                 <a:latin typeface="Calibri" panose="020F0502020204030204" pitchFamily="34" charset="0"/>
                 <a:cs typeface="Calibri" panose="020F0502020204030204" pitchFamily="34" charset="0"/>
               </a:rPr>
             </a:br>
-            <a:r>
-              <a:rPr lang="en-US" sz="2800" b="0" dirty="0">
-                <a:latin typeface="Calibri" panose="020F0502020204030204" pitchFamily="34" charset="0"/>
-                <a:cs typeface="Calibri" panose="020F0502020204030204" pitchFamily="34" charset="0"/>
-              </a:rPr>
-              <a:t/>
-            </a:r>
             <a:br>
               <a:rPr lang="en-US" sz="2800" b="0" dirty="0">
                 <a:latin typeface="Calibri" panose="020F0502020204030204" pitchFamily="34" charset="0"/>
@@ -5470,17 +5435,10 @@
                 <a:latin typeface="Calibri"/>
                 <a:cs typeface="Calibri"/>
               </a:rPr>
-              <a:t>Our  Independent variable</a:t>
-            </a:r>
-            <a:r>
-              <a:rPr lang="en-US" sz="2800" b="0" dirty="0" smtClean="0">
-                <a:latin typeface="Calibri"/>
-                <a:cs typeface="Calibri"/>
-              </a:rPr>
-              <a:t>: </a:t>
-            </a:r>
-            <a:r>
-              <a:rPr lang="en-US" sz="2800" b="0" dirty="0" smtClean="0">
+              <a:t>Our  Independent variable: </a:t>
+            </a:r>
+            <a:r>
+              <a:rPr lang="en-US" sz="2800" b="0" dirty="0">
                 <a:solidFill>
                   <a:srgbClr val="FF0000"/>
                 </a:solidFill>
@@ -5488,13 +5446,6 @@
                 <a:cs typeface="Calibri"/>
               </a:rPr>
               <a:t>locations.</a:t>
-            </a:r>
-            <a:r>
-              <a:rPr lang="en-US" sz="2800" b="0" dirty="0">
-                <a:latin typeface="Calibri" panose="020F0502020204030204" pitchFamily="34" charset="0"/>
-                <a:cs typeface="Calibri" panose="020F0502020204030204" pitchFamily="34" charset="0"/>
-              </a:rPr>
-              <a:t/>
             </a:r>
             <a:br>
               <a:rPr lang="en-US" sz="2800" b="0" dirty="0">
@@ -5529,13 +5480,6 @@
               </a:rPr>
               <a:t>Nominal/categorial</a:t>
             </a:r>
-            <a:r>
-              <a:rPr lang="en-US" sz="2800" b="0" dirty="0">
-                <a:latin typeface="Calibri" panose="020F0502020204030204" pitchFamily="34" charset="0"/>
-                <a:cs typeface="Calibri" panose="020F0502020204030204" pitchFamily="34" charset="0"/>
-              </a:rPr>
-              <a:t/>
-            </a:r>
             <a:br>
               <a:rPr lang="en-US" sz="2800" b="0" dirty="0">
                 <a:latin typeface="Calibri" panose="020F0502020204030204" pitchFamily="34" charset="0"/>
@@ -5558,13 +5502,6 @@
                 <a:cs typeface="Calibri"/>
               </a:rPr>
               <a:t>daily_vaccinations</a:t>
-            </a:r>
-            <a:r>
-              <a:rPr lang="en-US" sz="2800" b="0" dirty="0">
-                <a:latin typeface="Calibri" panose="020F0502020204030204" pitchFamily="34" charset="0"/>
-                <a:cs typeface="Calibri" panose="020F0502020204030204" pitchFamily="34" charset="0"/>
-              </a:rPr>
-              <a:t/>
             </a:r>
             <a:br>
               <a:rPr lang="en-US" sz="2800" b="0" dirty="0">
@@ -5637,7 +5574,7 @@
           <p:cNvPr id="2" name="Subtitle 1">
             <a:extLst>
               <a:ext uri="{FF2B5EF4-FFF2-40B4-BE49-F238E27FC236}">
-                <a16:creationId xmlns="" xmlns:a16="http://schemas.microsoft.com/office/drawing/2014/main" id="{8E3CD731-5ACF-B002-247D-243F6E2149EC}"/>
+                <a16:creationId xmlns:a16="http://schemas.microsoft.com/office/drawing/2014/main" id="{8E3CD731-5ACF-B002-247D-243F6E2149EC}"/>
               </a:ext>
             </a:extLst>
           </p:cNvPr>
@@ -5680,7 +5617,7 @@
           <p:cNvPr id="3" name="Footer Placeholder 2">
             <a:extLst>
               <a:ext uri="{FF2B5EF4-FFF2-40B4-BE49-F238E27FC236}">
-                <a16:creationId xmlns="" xmlns:a16="http://schemas.microsoft.com/office/drawing/2014/main" id="{3C4D431B-7665-75B0-2D73-5BD588DCB766}"/>
+                <a16:creationId xmlns:a16="http://schemas.microsoft.com/office/drawing/2014/main" id="{3C4D431B-7665-75B0-2D73-5BD588DCB766}"/>
               </a:ext>
             </a:extLst>
           </p:cNvPr>
@@ -5708,7 +5645,7 @@
           <p:cNvPr id="4" name="Slide Number Placeholder 3">
             <a:extLst>
               <a:ext uri="{FF2B5EF4-FFF2-40B4-BE49-F238E27FC236}">
-                <a16:creationId xmlns="" xmlns:a16="http://schemas.microsoft.com/office/drawing/2014/main" id="{1625FA15-B17F-387B-E383-5505647ABB89}"/>
+                <a16:creationId xmlns:a16="http://schemas.microsoft.com/office/drawing/2014/main" id="{1625FA15-B17F-387B-E383-5505647ABB89}"/>
               </a:ext>
             </a:extLst>
           </p:cNvPr>
@@ -5742,7 +5679,7 @@
           <p:cNvPr id="5" name="Title 4">
             <a:extLst>
               <a:ext uri="{FF2B5EF4-FFF2-40B4-BE49-F238E27FC236}">
-                <a16:creationId xmlns="" xmlns:a16="http://schemas.microsoft.com/office/drawing/2014/main" id="{3440DA25-F620-152B-DE9E-776F7B74DFF0}"/>
+                <a16:creationId xmlns:a16="http://schemas.microsoft.com/office/drawing/2014/main" id="{3440DA25-F620-152B-DE9E-776F7B74DFF0}"/>
               </a:ext>
             </a:extLst>
           </p:cNvPr>
@@ -5770,15 +5707,6 @@
                 <a:spcPct val="100000"/>
               </a:lnSpc>
             </a:pPr>
-            <a:r>
-              <a:rPr lang="en-IE" sz="2400" dirty="0">
-                <a:effectLst/>
-                <a:latin typeface="Calibri" panose="020F0502020204030204" pitchFamily="34" charset="0"/>
-                <a:ea typeface="Calibri" panose="020F0502020204030204" pitchFamily="34" charset="0"/>
-                <a:cs typeface="Times New Roman" panose="02020603050405020304" pitchFamily="18" charset="0"/>
-              </a:rPr>
-              <a:t/>
-            </a:r>
             <a:br>
               <a:rPr lang="en-IE" sz="2400" dirty="0">
                 <a:effectLst/>
@@ -5787,15 +5715,6 @@
                 <a:cs typeface="Times New Roman" panose="02020603050405020304" pitchFamily="18" charset="0"/>
               </a:rPr>
             </a:br>
-            <a:r>
-              <a:rPr lang="en-IE" sz="4000" dirty="0">
-                <a:effectLst/>
-                <a:latin typeface="Calibri" panose="020F0502020204030204" pitchFamily="34" charset="0"/>
-                <a:ea typeface="Calibri" panose="020F0502020204030204" pitchFamily="34" charset="0"/>
-                <a:cs typeface="Times New Roman" panose="02020603050405020304" pitchFamily="18" charset="0"/>
-              </a:rPr>
-              <a:t/>
-            </a:r>
             <a:br>
               <a:rPr lang="en-IE" sz="4000" dirty="0">
                 <a:effectLst/>
@@ -5846,7 +5765,7 @@
                 <a:ea typeface="Calibri" panose="020F0502020204030204" pitchFamily="34" charset="0"/>
                 <a:cs typeface="Times New Roman" panose="02020603050405020304" pitchFamily="18" charset="0"/>
               </a:rPr>
-              <a:t>American Samoa </a:t>
+              <a:t>ALASKA </a:t>
             </a:r>
             <a:r>
               <a:rPr lang="en-US" sz="4000" b="0" dirty="0">
@@ -5868,7 +5787,7 @@
                 <a:ea typeface="Calibri" panose="020F0502020204030204" pitchFamily="34" charset="0"/>
                 <a:cs typeface="Times New Roman" panose="02020603050405020304" pitchFamily="18" charset="0"/>
               </a:rPr>
-              <a:t>Northern Mariana Islands</a:t>
+              <a:t>DISTRICT OF COLUMBIA </a:t>
             </a:r>
             <a:r>
               <a:rPr lang="en-US" sz="4000" b="0" dirty="0">
@@ -5879,22 +5798,13 @@
               <a:t> in 2021 and 2023?</a:t>
             </a:r>
             <a:r>
-              <a:rPr lang="en-IE" sz="4000" b="0" dirty="0" smtClean="0">
+              <a:rPr lang="en-IE" sz="4000" b="0" dirty="0">
                 <a:effectLst/>
                 <a:latin typeface="Calibri" panose="020F0502020204030204" pitchFamily="34" charset="0"/>
                 <a:ea typeface="Calibri" panose="020F0502020204030204" pitchFamily="34" charset="0"/>
                 <a:cs typeface="Times New Roman" panose="02020603050405020304" pitchFamily="18" charset="0"/>
               </a:rPr>
               <a:t>”.</a:t>
-            </a:r>
-            <a:r>
-              <a:rPr lang="en-GB" sz="2400" b="0" dirty="0">
-                <a:effectLst/>
-                <a:latin typeface="Calibri" panose="020F0502020204030204" pitchFamily="34" charset="0"/>
-                <a:ea typeface="Calibri" panose="020F0502020204030204" pitchFamily="34" charset="0"/>
-                <a:cs typeface="Times New Roman" panose="02020603050405020304" pitchFamily="18" charset="0"/>
-              </a:rPr>
-              <a:t/>
             </a:r>
             <a:br>
               <a:rPr lang="en-GB" sz="2400" b="0" dirty="0">
@@ -5904,18 +5814,6 @@
                 <a:cs typeface="Times New Roman" panose="02020603050405020304" pitchFamily="18" charset="0"/>
               </a:rPr>
             </a:br>
-            <a:r>
-              <a:rPr lang="en-IE" sz="2400" dirty="0">
-                <a:solidFill>
-                  <a:srgbClr val="000000"/>
-                </a:solidFill>
-                <a:effectLst/>
-                <a:latin typeface="Calibri" panose="020F0502020204030204" pitchFamily="34" charset="0"/>
-                <a:ea typeface="Calibri" panose="020F0502020204030204" pitchFamily="34" charset="0"/>
-                <a:cs typeface="Times New Roman" panose="02020603050405020304" pitchFamily="18" charset="0"/>
-              </a:rPr>
-              <a:t/>
-            </a:r>
             <a:br>
               <a:rPr lang="en-IE" sz="2400" dirty="0">
                 <a:solidFill>
@@ -5927,15 +5825,6 @@
                 <a:cs typeface="Times New Roman" panose="02020603050405020304" pitchFamily="18" charset="0"/>
               </a:rPr>
             </a:br>
-            <a:r>
-              <a:rPr lang="en-GB" sz="2400" dirty="0">
-                <a:effectLst/>
-                <a:latin typeface="Calibri" panose="020F0502020204030204" pitchFamily="34" charset="0"/>
-                <a:ea typeface="Calibri" panose="020F0502020204030204" pitchFamily="34" charset="0"/>
-                <a:cs typeface="Times New Roman" panose="02020603050405020304" pitchFamily="18" charset="0"/>
-              </a:rPr>
-              <a:t/>
-            </a:r>
             <a:br>
               <a:rPr lang="en-GB" sz="2400" dirty="0">
                 <a:effectLst/>
@@ -5987,7 +5876,7 @@
           <p:cNvPr id="2" name="Subtitle 1">
             <a:extLst>
               <a:ext uri="{FF2B5EF4-FFF2-40B4-BE49-F238E27FC236}">
-                <a16:creationId xmlns="" xmlns:a16="http://schemas.microsoft.com/office/drawing/2014/main" id="{6B64221B-D6D4-E382-A91A-99FF908D5475}"/>
+                <a16:creationId xmlns:a16="http://schemas.microsoft.com/office/drawing/2014/main" id="{6B64221B-D6D4-E382-A91A-99FF908D5475}"/>
               </a:ext>
             </a:extLst>
           </p:cNvPr>
@@ -6043,17 +5932,7 @@
                 <a:latin typeface="Arial"/>
                 <a:cs typeface="Arial"/>
               </a:rPr>
-              <a:t>): There is no difference in the mean </a:t>
-            </a:r>
-            <a:r>
-              <a:rPr lang="en-GB" sz="2800" b="0" dirty="0" smtClean="0">
-                <a:solidFill>
-                  <a:srgbClr val="FF0000"/>
-                </a:solidFill>
-                <a:latin typeface="Arial"/>
-                <a:cs typeface="Arial"/>
-              </a:rPr>
-              <a:t>of daily vaccinations between </a:t>
+              <a:t>): There is no difference in the mean of daily vaccinations between </a:t>
             </a:r>
             <a:r>
               <a:rPr lang="en-US" sz="2800" b="0" dirty="0">
@@ -6064,10 +5943,10 @@
                 <a:ea typeface="Calibri" panose="020F0502020204030204" pitchFamily="34" charset="0"/>
                 <a:cs typeface="Times New Roman" panose="02020603050405020304" pitchFamily="18" charset="0"/>
               </a:rPr>
-              <a:t>American Samoa </a:t>
-            </a:r>
-            <a:r>
-              <a:rPr lang="en-US" sz="2800" b="0" dirty="0" smtClean="0">
+              <a:t>ALASKA and DISTRICT OF COLUMBIA in 2021 </a:t>
+            </a:r>
+            <a:r>
+              <a:rPr lang="en-US" sz="2800" b="0">
                 <a:solidFill>
                   <a:srgbClr val="FF0000"/>
                 </a:solidFill>
@@ -6075,29 +5954,7 @@
                 <a:ea typeface="Calibri" panose="020F0502020204030204" pitchFamily="34" charset="0"/>
                 <a:cs typeface="Times New Roman" panose="02020603050405020304" pitchFamily="18" charset="0"/>
               </a:rPr>
-              <a:t>and </a:t>
-            </a:r>
-            <a:r>
-              <a:rPr lang="en-US" sz="2800" b="0" dirty="0">
-                <a:solidFill>
-                  <a:srgbClr val="FF0000"/>
-                </a:solidFill>
-                <a:latin typeface="Calibri" panose="020F0502020204030204" pitchFamily="34" charset="0"/>
-                <a:ea typeface="Calibri" panose="020F0502020204030204" pitchFamily="34" charset="0"/>
-                <a:cs typeface="Times New Roman" panose="02020603050405020304" pitchFamily="18" charset="0"/>
-              </a:rPr>
-              <a:t>Northern Mariana </a:t>
-            </a:r>
-            <a:r>
-              <a:rPr lang="en-US" sz="2800" b="0" dirty="0" smtClean="0">
-                <a:solidFill>
-                  <a:srgbClr val="FF0000"/>
-                </a:solidFill>
-                <a:latin typeface="Calibri" panose="020F0502020204030204" pitchFamily="34" charset="0"/>
-                <a:ea typeface="Calibri" panose="020F0502020204030204" pitchFamily="34" charset="0"/>
-                <a:cs typeface="Times New Roman" panose="02020603050405020304" pitchFamily="18" charset="0"/>
-              </a:rPr>
-              <a:t>Islands in 2021 and 2023</a:t>
+              <a:t>and 2023.</a:t>
             </a:r>
             <a:endParaRPr lang="en-GB" sz="2800" b="0" dirty="0">
               <a:solidFill>
@@ -6164,43 +6021,7 @@
                 </a:solidFill>
                 <a:cs typeface="Arial"/>
               </a:rPr>
-              <a:t>There is </a:t>
-            </a:r>
-            <a:r>
-              <a:rPr lang="en-GB" sz="2800" b="0" dirty="0" smtClean="0">
-                <a:solidFill>
-                  <a:srgbClr val="FF0000"/>
-                </a:solidFill>
-                <a:cs typeface="Arial"/>
-              </a:rPr>
-              <a:t>a difference </a:t>
-            </a:r>
-            <a:r>
-              <a:rPr lang="en-GB" sz="2800" b="0" dirty="0">
-                <a:solidFill>
-                  <a:srgbClr val="FF0000"/>
-                </a:solidFill>
-                <a:cs typeface="Arial"/>
-              </a:rPr>
-              <a:t>in the mean of </a:t>
-            </a:r>
-            <a:r>
-              <a:rPr lang="en-GB" sz="2800" b="0" dirty="0" smtClean="0">
-                <a:solidFill>
-                  <a:srgbClr val="FF0000"/>
-                </a:solidFill>
-                <a:cs typeface="Arial"/>
-              </a:rPr>
-              <a:t>daily vaccinations </a:t>
-            </a:r>
-            <a:r>
-              <a:rPr lang="en-GB" sz="2800" b="0" dirty="0">
-                <a:solidFill>
-                  <a:srgbClr val="FF0000"/>
-                </a:solidFill>
-                <a:cs typeface="Arial"/>
-              </a:rPr>
-              <a:t>between </a:t>
+              <a:t>There is a difference in the mean of daily vaccinations between </a:t>
             </a:r>
             <a:r>
               <a:rPr lang="en-US" sz="2800" b="0" dirty="0">
@@ -6211,7 +6032,7 @@
                 <a:ea typeface="Calibri" panose="020F0502020204030204" pitchFamily="34" charset="0"/>
                 <a:cs typeface="Times New Roman" panose="02020603050405020304" pitchFamily="18" charset="0"/>
               </a:rPr>
-              <a:t>American Samoa and Northern Mariana Islands in 2021 and 2023</a:t>
+              <a:t>ALASKA and DISTRICT OF COLUMBIA in 2021 and 2023.</a:t>
             </a:r>
             <a:endParaRPr lang="en-GB" sz="2800" b="0" dirty="0">
               <a:solidFill>
@@ -6241,7 +6062,7 @@
           <p:cNvPr id="4" name="Slide Number Placeholder 3">
             <a:extLst>
               <a:ext uri="{FF2B5EF4-FFF2-40B4-BE49-F238E27FC236}">
-                <a16:creationId xmlns="" xmlns:a16="http://schemas.microsoft.com/office/drawing/2014/main" id="{FF7EDF94-2B89-A21D-BBC0-E455C2D9893B}"/>
+                <a16:creationId xmlns:a16="http://schemas.microsoft.com/office/drawing/2014/main" id="{FF7EDF94-2B89-A21D-BBC0-E455C2D9893B}"/>
               </a:ext>
             </a:extLst>
           </p:cNvPr>
@@ -7135,6 +6956,14 @@
 </file>
 
 <file path=customXml/item1.xml><?xml version="1.0" encoding="utf-8"?>
+<p:properties xmlns:p="http://schemas.microsoft.com/office/2006/metadata/properties" xmlns:xsi="http://www.w3.org/2001/XMLSchema-instance" xmlns:pc="http://schemas.microsoft.com/office/infopath/2007/PartnerControls">
+  <documentManagement>
+    <Information xmlns="4ad138b4-2b68-4b70-945d-07f8f18b1c9a" xsi:nil="true"/>
+  </documentManagement>
+</p:properties>
+</file>
+
+<file path=customXml/item2.xml><?xml version="1.0" encoding="utf-8"?>
 <ct:contentTypeSchema xmlns:ct="http://schemas.microsoft.com/office/2006/metadata/contentType" xmlns:ma="http://schemas.microsoft.com/office/2006/metadata/properties/metaAttributes" ct:_="" ma:_="" ma:contentTypeName="Document" ma:contentTypeID="0x01010026DBA85F447B164191BB36C258697B67" ma:contentTypeVersion="14" ma:contentTypeDescription="Create a new document." ma:contentTypeScope="" ma:versionID="ea511d05ca7f895fe9556935b5c9af34">
   <xsd:schema xmlns:xsd="http://www.w3.org/2001/XMLSchema" xmlns:xs="http://www.w3.org/2001/XMLSchema" xmlns:p="http://schemas.microsoft.com/office/2006/metadata/properties" xmlns:ns2="4ad138b4-2b68-4b70-945d-07f8f18b1c9a" xmlns:ns3="3c474641-ec36-472f-b125-6b1b0910eaa4" targetNamespace="http://schemas.microsoft.com/office/2006/metadata/properties" ma:root="true" ma:fieldsID="662270106d7a7e100bcac2c5f8d29899" ns2:_="" ns3:_="">
     <xsd:import namespace="4ad138b4-2b68-4b70-945d-07f8f18b1c9a"/>
@@ -7359,7 +7188,7 @@
 </ct:contentTypeSchema>
 </file>
 
-<file path=customXml/item2.xml><?xml version="1.0" encoding="utf-8"?>
+<file path=customXml/item3.xml><?xml version="1.0" encoding="utf-8"?>
 <?mso-contentType ?>
 <FormTemplates xmlns="http://schemas.microsoft.com/sharepoint/v3/contenttype/forms">
   <Display>DocumentLibraryForm</Display>
@@ -7368,15 +7197,24 @@
 </FormTemplates>
 </file>
 
-<file path=customXml/item3.xml><?xml version="1.0" encoding="utf-8"?>
-<p:properties xmlns:p="http://schemas.microsoft.com/office/2006/metadata/properties" xmlns:xsi="http://www.w3.org/2001/XMLSchema-instance" xmlns:pc="http://schemas.microsoft.com/office/infopath/2007/PartnerControls">
-  <documentManagement>
-    <Information xmlns="4ad138b4-2b68-4b70-945d-07f8f18b1c9a" xsi:nil="true"/>
-  </documentManagement>
-</p:properties>
+<file path=customXml/itemProps1.xml><?xml version="1.0" encoding="utf-8"?>
+<ds:datastoreItem xmlns:ds="http://schemas.openxmlformats.org/officeDocument/2006/customXml" ds:itemID="{EDD1FC41-23C7-41B0-B5F9-BF4CD38AD2ED}">
+  <ds:schemaRefs>
+    <ds:schemaRef ds:uri="http://purl.org/dc/elements/1.1/"/>
+    <ds:schemaRef ds:uri="http://purl.org/dc/dcmitype/"/>
+    <ds:schemaRef ds:uri="http://www.w3.org/XML/1998/namespace"/>
+    <ds:schemaRef ds:uri="4ad138b4-2b68-4b70-945d-07f8f18b1c9a"/>
+    <ds:schemaRef ds:uri="http://schemas.microsoft.com/office/2006/documentManagement/types"/>
+    <ds:schemaRef ds:uri="3c474641-ec36-472f-b125-6b1b0910eaa4"/>
+    <ds:schemaRef ds:uri="http://purl.org/dc/terms/"/>
+    <ds:schemaRef ds:uri="http://schemas.microsoft.com/office/infopath/2007/PartnerControls"/>
+    <ds:schemaRef ds:uri="http://schemas.openxmlformats.org/package/2006/metadata/core-properties"/>
+    <ds:schemaRef ds:uri="http://schemas.microsoft.com/office/2006/metadata/properties"/>
+  </ds:schemaRefs>
+</ds:datastoreItem>
 </file>
 
-<file path=customXml/itemProps1.xml><?xml version="1.0" encoding="utf-8"?>
+<file path=customXml/itemProps2.xml><?xml version="1.0" encoding="utf-8"?>
 <ds:datastoreItem xmlns:ds="http://schemas.openxmlformats.org/officeDocument/2006/customXml" ds:itemID="{421B8C57-903D-4D0E-8336-7B512F760CD1}">
   <ds:schemaRefs>
     <ds:schemaRef ds:uri="http://schemas.microsoft.com/office/2006/metadata/contentType"/>
@@ -7395,27 +7233,10 @@
 </ds:datastoreItem>
 </file>
 
-<file path=customXml/itemProps2.xml><?xml version="1.0" encoding="utf-8"?>
+<file path=customXml/itemProps3.xml><?xml version="1.0" encoding="utf-8"?>
 <ds:datastoreItem xmlns:ds="http://schemas.openxmlformats.org/officeDocument/2006/customXml" ds:itemID="{91C521DD-2673-4EE6-BB9B-DC5C3320FFBB}">
   <ds:schemaRefs>
     <ds:schemaRef ds:uri="http://schemas.microsoft.com/sharepoint/v3/contenttype/forms"/>
   </ds:schemaRefs>
 </ds:datastoreItem>
-</file>
-
-<file path=customXml/itemProps3.xml><?xml version="1.0" encoding="utf-8"?>
-<ds:datastoreItem xmlns:ds="http://schemas.openxmlformats.org/officeDocument/2006/customXml" ds:itemID="{EDD1FC41-23C7-41B0-B5F9-BF4CD38AD2ED}">
-  <ds:schemaRefs>
-    <ds:schemaRef ds:uri="http://purl.org/dc/elements/1.1/"/>
-    <ds:schemaRef ds:uri="http://purl.org/dc/dcmitype/"/>
-    <ds:schemaRef ds:uri="http://www.w3.org/XML/1998/namespace"/>
-    <ds:schemaRef ds:uri="4ad138b4-2b68-4b70-945d-07f8f18b1c9a"/>
-    <ds:schemaRef ds:uri="http://schemas.microsoft.com/office/2006/documentManagement/types"/>
-    <ds:schemaRef ds:uri="3c474641-ec36-472f-b125-6b1b0910eaa4"/>
-    <ds:schemaRef ds:uri="http://purl.org/dc/terms/"/>
-    <ds:schemaRef ds:uri="http://schemas.microsoft.com/office/infopath/2007/PartnerControls"/>
-    <ds:schemaRef ds:uri="http://schemas.openxmlformats.org/package/2006/metadata/core-properties"/>
-    <ds:schemaRef ds:uri="http://schemas.microsoft.com/office/2006/metadata/properties"/>
-  </ds:schemaRefs>
-</ds:datastoreItem>
 </file>
</xml_diff>